<commit_message>
Revert "Revert "Revert "PPP"""
This reverts commit d9526c6c98fb231254a722405d9ded5ab11a8b1a.
</commit_message>
<xml_diff>
--- a/GP_presentation.pptx
+++ b/GP_presentation.pptx
@@ -7,7 +7,7 @@
     <p:sldMasterId id="2147483696" r:id="rId3"/>
   </p:sldMasterIdLst>
   <p:notesMasterIdLst>
-    <p:notesMasterId r:id="rId31"/>
+    <p:notesMasterId r:id="rId30"/>
   </p:notesMasterIdLst>
   <p:sldIdLst>
     <p:sldId id="283" r:id="rId4"/>
@@ -36,7 +36,6 @@
     <p:sldId id="291" r:id="rId27"/>
     <p:sldId id="292" r:id="rId28"/>
     <p:sldId id="293" r:id="rId29"/>
-    <p:sldId id="296" r:id="rId30"/>
   </p:sldIdLst>
   <p:sldSz cx="9144000" cy="6858000" type="screen4x3"/>
   <p:notesSz cx="6858000" cy="9144000"/>
@@ -29987,695 +29986,6 @@
       </p:transition>
     </mc:Fallback>
   </mc:AlternateContent>
-  <p:timing>
-    <p:tnLst>
-      <p:par>
-        <p:cTn id="1" dur="indefinite" restart="never" nodeType="tmRoot"/>
-      </p:par>
-    </p:tnLst>
-  </p:timing>
-</p:sld>
-</file>
-
-<file path=ppt/slides/slide27.xml><?xml version="1.0" encoding="utf-8"?>
-<p:sld xmlns:a="http://schemas.openxmlformats.org/drawingml/2006/main" xmlns:r="http://schemas.openxmlformats.org/officeDocument/2006/relationships" xmlns:p="http://schemas.openxmlformats.org/presentationml/2006/main">
-  <p:cSld>
-    <p:spTree>
-      <p:nvGrpSpPr>
-        <p:cNvPr id="1" name=""/>
-        <p:cNvGrpSpPr/>
-        <p:nvPr/>
-      </p:nvGrpSpPr>
-      <p:grpSpPr>
-        <a:xfrm>
-          <a:off x="0" y="0"/>
-          <a:ext cx="0" cy="0"/>
-          <a:chOff x="0" y="0"/>
-          <a:chExt cx="0" cy="0"/>
-        </a:xfrm>
-      </p:grpSpPr>
-      <p:sp>
-        <p:nvSpPr>
-          <p:cNvPr id="2" name="Title 1"/>
-          <p:cNvSpPr>
-            <a:spLocks noGrp="1"/>
-          </p:cNvSpPr>
-          <p:nvPr>
-            <p:ph type="title"/>
-          </p:nvPr>
-        </p:nvSpPr>
-        <p:spPr/>
-        <p:txBody>
-          <a:bodyPr/>
-          <a:lstStyle/>
-          <a:p>
-            <a:r>
-              <a:rPr lang="en-US" dirty="0" smtClean="0"/>
-              <a:t>Team Contribution</a:t>
-            </a:r>
-            <a:endParaRPr lang="en-US" dirty="0"/>
-          </a:p>
-        </p:txBody>
-      </p:sp>
-      <p:graphicFrame>
-        <p:nvGraphicFramePr>
-          <p:cNvPr id="5" name="Content Placeholder 4"/>
-          <p:cNvGraphicFramePr>
-            <a:graphicFrameLocks noGrp="1"/>
-          </p:cNvGraphicFramePr>
-          <p:nvPr>
-            <p:ph idx="1"/>
-            <p:extLst>
-              <p:ext uri="{D42A27DB-BD31-4B8C-83A1-F6EECF244321}">
-                <p14:modId xmlns:p14="http://schemas.microsoft.com/office/powerpoint/2010/main" val="1307033734"/>
-              </p:ext>
-            </p:extLst>
-          </p:nvPr>
-        </p:nvGraphicFramePr>
-        <p:xfrm>
-          <a:off x="235531" y="1600199"/>
-          <a:ext cx="8742213" cy="3716814"/>
-        </p:xfrm>
-        <a:graphic>
-          <a:graphicData uri="http://schemas.openxmlformats.org/drawingml/2006/table">
-            <a:tbl>
-              <a:tblPr firstRow="1" bandRow="1">
-                <a:tableStyleId>{5C22544A-7EE6-4342-B048-85BDC9FD1C3A}</a:tableStyleId>
-              </a:tblPr>
-              <a:tblGrid>
-                <a:gridCol w="1496287">
-                  <a:extLst>
-                    <a:ext uri="{9D8B030D-6E8A-4147-A177-3AD203B41FA5}">
-                      <a16:colId xmlns:a16="http://schemas.microsoft.com/office/drawing/2014/main" val="173855607"/>
-                    </a:ext>
-                  </a:extLst>
-                </a:gridCol>
-                <a:gridCol w="446427">
-                  <a:extLst>
-                    <a:ext uri="{9D8B030D-6E8A-4147-A177-3AD203B41FA5}">
-                      <a16:colId xmlns:a16="http://schemas.microsoft.com/office/drawing/2014/main" val="3027779581"/>
-                    </a:ext>
-                  </a:extLst>
-                </a:gridCol>
-                <a:gridCol w="971357">
-                  <a:extLst>
-                    <a:ext uri="{9D8B030D-6E8A-4147-A177-3AD203B41FA5}">
-                      <a16:colId xmlns:a16="http://schemas.microsoft.com/office/drawing/2014/main" val="1575102433"/>
-                    </a:ext>
-                  </a:extLst>
-                </a:gridCol>
-                <a:gridCol w="971357">
-                  <a:extLst>
-                    <a:ext uri="{9D8B030D-6E8A-4147-A177-3AD203B41FA5}">
-                      <a16:colId xmlns:a16="http://schemas.microsoft.com/office/drawing/2014/main" val="3442806467"/>
-                    </a:ext>
-                  </a:extLst>
-                </a:gridCol>
-                <a:gridCol w="971357">
-                  <a:extLst>
-                    <a:ext uri="{9D8B030D-6E8A-4147-A177-3AD203B41FA5}">
-                      <a16:colId xmlns:a16="http://schemas.microsoft.com/office/drawing/2014/main" val="145740980"/>
-                    </a:ext>
-                  </a:extLst>
-                </a:gridCol>
-                <a:gridCol w="971357">
-                  <a:extLst>
-                    <a:ext uri="{9D8B030D-6E8A-4147-A177-3AD203B41FA5}">
-                      <a16:colId xmlns:a16="http://schemas.microsoft.com/office/drawing/2014/main" val="2944762169"/>
-                    </a:ext>
-                  </a:extLst>
-                </a:gridCol>
-                <a:gridCol w="971357">
-                  <a:extLst>
-                    <a:ext uri="{9D8B030D-6E8A-4147-A177-3AD203B41FA5}">
-                      <a16:colId xmlns:a16="http://schemas.microsoft.com/office/drawing/2014/main" val="628917987"/>
-                    </a:ext>
-                  </a:extLst>
-                </a:gridCol>
-                <a:gridCol w="971357">
-                  <a:extLst>
-                    <a:ext uri="{9D8B030D-6E8A-4147-A177-3AD203B41FA5}">
-                      <a16:colId xmlns:a16="http://schemas.microsoft.com/office/drawing/2014/main" val="4202052299"/>
-                    </a:ext>
-                  </a:extLst>
-                </a:gridCol>
-                <a:gridCol w="971357">
-                  <a:extLst>
-                    <a:ext uri="{9D8B030D-6E8A-4147-A177-3AD203B41FA5}">
-                      <a16:colId xmlns:a16="http://schemas.microsoft.com/office/drawing/2014/main" val="2030155649"/>
-                    </a:ext>
-                  </a:extLst>
-                </a:gridCol>
-              </a:tblGrid>
-              <a:tr h="760956">
-                <a:tc>
-                  <a:txBody>
-                    <a:bodyPr/>
-                    <a:lstStyle/>
-                    <a:p>
-                      <a:endParaRPr lang="en-US" dirty="0"/>
-                    </a:p>
-                  </a:txBody>
-                  <a:tcPr/>
-                </a:tc>
-                <a:tc>
-                  <a:txBody>
-                    <a:bodyPr/>
-                    <a:lstStyle/>
-                    <a:p>
-                      <a:endParaRPr lang="en-US"/>
-                    </a:p>
-                  </a:txBody>
-                  <a:tcPr/>
-                </a:tc>
-                <a:tc>
-                  <a:txBody>
-                    <a:bodyPr/>
-                    <a:lstStyle/>
-                    <a:p>
-                      <a:endParaRPr lang="en-US"/>
-                    </a:p>
-                  </a:txBody>
-                  <a:tcPr/>
-                </a:tc>
-                <a:tc>
-                  <a:txBody>
-                    <a:bodyPr/>
-                    <a:lstStyle/>
-                    <a:p>
-                      <a:endParaRPr lang="en-US" dirty="0"/>
-                    </a:p>
-                  </a:txBody>
-                  <a:tcPr/>
-                </a:tc>
-                <a:tc>
-                  <a:txBody>
-                    <a:bodyPr/>
-                    <a:lstStyle/>
-                    <a:p>
-                      <a:endParaRPr lang="en-US"/>
-                    </a:p>
-                  </a:txBody>
-                  <a:tcPr/>
-                </a:tc>
-                <a:tc>
-                  <a:txBody>
-                    <a:bodyPr/>
-                    <a:lstStyle/>
-                    <a:p>
-                      <a:endParaRPr lang="en-US"/>
-                    </a:p>
-                  </a:txBody>
-                  <a:tcPr/>
-                </a:tc>
-                <a:tc>
-                  <a:txBody>
-                    <a:bodyPr/>
-                    <a:lstStyle/>
-                    <a:p>
-                      <a:endParaRPr lang="en-US"/>
-                    </a:p>
-                  </a:txBody>
-                  <a:tcPr/>
-                </a:tc>
-                <a:tc>
-                  <a:txBody>
-                    <a:bodyPr/>
-                    <a:lstStyle/>
-                    <a:p>
-                      <a:endParaRPr lang="en-US"/>
-                    </a:p>
-                  </a:txBody>
-                  <a:tcPr/>
-                </a:tc>
-                <a:tc>
-                  <a:txBody>
-                    <a:bodyPr/>
-                    <a:lstStyle/>
-                    <a:p>
-                      <a:endParaRPr lang="en-US"/>
-                    </a:p>
-                  </a:txBody>
-                  <a:tcPr/>
-                </a:tc>
-                <a:extLst>
-                  <a:ext uri="{0D108BD9-81ED-4DB2-BD59-A6C34878D82A}">
-                    <a16:rowId xmlns:a16="http://schemas.microsoft.com/office/drawing/2014/main" val="1636377364"/>
-                  </a:ext>
-                </a:extLst>
-              </a:tr>
-              <a:tr h="672990">
-                <a:tc>
-                  <a:txBody>
-                    <a:bodyPr/>
-                    <a:lstStyle/>
-                    <a:p>
-                      <a:pPr marL="0" marR="0" lvl="0" indent="0" algn="l" defTabSz="914400" rtl="0" eaLnBrk="1" fontAlgn="auto" latinLnBrk="0" hangingPunct="1">
-                        <a:lnSpc>
-                          <a:spcPct val="100000"/>
-                        </a:lnSpc>
-                        <a:spcBef>
-                          <a:spcPts val="0"/>
-                        </a:spcBef>
-                        <a:spcAft>
-                          <a:spcPts val="0"/>
-                        </a:spcAft>
-                        <a:buClrTx/>
-                        <a:buSzTx/>
-                        <a:buFontTx/>
-                        <a:buNone/>
-                        <a:tabLst/>
-                        <a:defRPr/>
-                      </a:pPr>
-                      <a:r>
-                        <a:rPr kumimoji="0" lang="en-US" sz="1800" b="0" i="0" u="none" strike="noStrike" kern="1200" cap="none" spc="0" normalizeH="0" baseline="0" noProof="0" dirty="0" err="1" smtClean="0">
-                          <a:ln>
-                            <a:noFill/>
-                          </a:ln>
-                          <a:solidFill>
-                            <a:schemeClr val="tx1"/>
-                          </a:solidFill>
-                          <a:effectLst/>
-                          <a:uLnTx/>
-                          <a:uFillTx/>
-                          <a:latin typeface="+mn-lt"/>
-                          <a:ea typeface="+mn-ea"/>
-                          <a:cs typeface="+mn-cs"/>
-                        </a:rPr>
-                        <a:t>Abdelrahman</a:t>
-                      </a:r>
-                      <a:endParaRPr lang="en-US" dirty="0">
-                        <a:solidFill>
-                          <a:schemeClr val="tx1"/>
-                        </a:solidFill>
-                      </a:endParaRPr>
-                    </a:p>
-                  </a:txBody>
-                  <a:tcPr/>
-                </a:tc>
-                <a:tc>
-                  <a:txBody>
-                    <a:bodyPr/>
-                    <a:lstStyle/>
-                    <a:p>
-                      <a:endParaRPr lang="en-US"/>
-                    </a:p>
-                  </a:txBody>
-                  <a:tcPr/>
-                </a:tc>
-                <a:tc>
-                  <a:txBody>
-                    <a:bodyPr/>
-                    <a:lstStyle/>
-                    <a:p>
-                      <a:endParaRPr lang="en-US" dirty="0"/>
-                    </a:p>
-                  </a:txBody>
-                  <a:tcPr/>
-                </a:tc>
-                <a:tc>
-                  <a:txBody>
-                    <a:bodyPr/>
-                    <a:lstStyle/>
-                    <a:p>
-                      <a:endParaRPr lang="en-US"/>
-                    </a:p>
-                  </a:txBody>
-                  <a:tcPr/>
-                </a:tc>
-                <a:tc>
-                  <a:txBody>
-                    <a:bodyPr/>
-                    <a:lstStyle/>
-                    <a:p>
-                      <a:endParaRPr lang="en-US"/>
-                    </a:p>
-                  </a:txBody>
-                  <a:tcPr/>
-                </a:tc>
-                <a:tc>
-                  <a:txBody>
-                    <a:bodyPr/>
-                    <a:lstStyle/>
-                    <a:p>
-                      <a:endParaRPr lang="en-US"/>
-                    </a:p>
-                  </a:txBody>
-                  <a:tcPr/>
-                </a:tc>
-                <a:tc>
-                  <a:txBody>
-                    <a:bodyPr/>
-                    <a:lstStyle/>
-                    <a:p>
-                      <a:endParaRPr lang="en-US"/>
-                    </a:p>
-                  </a:txBody>
-                  <a:tcPr/>
-                </a:tc>
-                <a:tc>
-                  <a:txBody>
-                    <a:bodyPr/>
-                    <a:lstStyle/>
-                    <a:p>
-                      <a:endParaRPr lang="en-US"/>
-                    </a:p>
-                  </a:txBody>
-                  <a:tcPr/>
-                </a:tc>
-                <a:tc>
-                  <a:txBody>
-                    <a:bodyPr/>
-                    <a:lstStyle/>
-                    <a:p>
-                      <a:endParaRPr lang="en-US"/>
-                    </a:p>
-                  </a:txBody>
-                  <a:tcPr/>
-                </a:tc>
-                <a:extLst>
-                  <a:ext uri="{0D108BD9-81ED-4DB2-BD59-A6C34878D82A}">
-                    <a16:rowId xmlns:a16="http://schemas.microsoft.com/office/drawing/2014/main" val="3871040589"/>
-                  </a:ext>
-                </a:extLst>
-              </a:tr>
-              <a:tr h="760956">
-                <a:tc>
-                  <a:txBody>
-                    <a:bodyPr/>
-                    <a:lstStyle/>
-                    <a:p>
-                      <a:r>
-                        <a:rPr lang="en-US" dirty="0" err="1" smtClean="0"/>
-                        <a:t>Ghadir</a:t>
-                      </a:r>
-                      <a:endParaRPr lang="en-US" dirty="0"/>
-                    </a:p>
-                  </a:txBody>
-                  <a:tcPr/>
-                </a:tc>
-                <a:tc>
-                  <a:txBody>
-                    <a:bodyPr/>
-                    <a:lstStyle/>
-                    <a:p>
-                      <a:endParaRPr lang="en-US"/>
-                    </a:p>
-                  </a:txBody>
-                  <a:tcPr/>
-                </a:tc>
-                <a:tc>
-                  <a:txBody>
-                    <a:bodyPr/>
-                    <a:lstStyle/>
-                    <a:p>
-                      <a:endParaRPr lang="en-US"/>
-                    </a:p>
-                  </a:txBody>
-                  <a:tcPr/>
-                </a:tc>
-                <a:tc>
-                  <a:txBody>
-                    <a:bodyPr/>
-                    <a:lstStyle/>
-                    <a:p>
-                      <a:endParaRPr lang="en-US"/>
-                    </a:p>
-                  </a:txBody>
-                  <a:tcPr/>
-                </a:tc>
-                <a:tc>
-                  <a:txBody>
-                    <a:bodyPr/>
-                    <a:lstStyle/>
-                    <a:p>
-                      <a:endParaRPr lang="en-US"/>
-                    </a:p>
-                  </a:txBody>
-                  <a:tcPr/>
-                </a:tc>
-                <a:tc>
-                  <a:txBody>
-                    <a:bodyPr/>
-                    <a:lstStyle/>
-                    <a:p>
-                      <a:endParaRPr lang="en-US"/>
-                    </a:p>
-                  </a:txBody>
-                  <a:tcPr/>
-                </a:tc>
-                <a:tc>
-                  <a:txBody>
-                    <a:bodyPr/>
-                    <a:lstStyle/>
-                    <a:p>
-                      <a:endParaRPr lang="en-US"/>
-                    </a:p>
-                  </a:txBody>
-                  <a:tcPr/>
-                </a:tc>
-                <a:tc>
-                  <a:txBody>
-                    <a:bodyPr/>
-                    <a:lstStyle/>
-                    <a:p>
-                      <a:endParaRPr lang="en-US"/>
-                    </a:p>
-                  </a:txBody>
-                  <a:tcPr/>
-                </a:tc>
-                <a:tc>
-                  <a:txBody>
-                    <a:bodyPr/>
-                    <a:lstStyle/>
-                    <a:p>
-                      <a:endParaRPr lang="en-US"/>
-                    </a:p>
-                  </a:txBody>
-                  <a:tcPr/>
-                </a:tc>
-                <a:extLst>
-                  <a:ext uri="{0D108BD9-81ED-4DB2-BD59-A6C34878D82A}">
-                    <a16:rowId xmlns:a16="http://schemas.microsoft.com/office/drawing/2014/main" val="2054196200"/>
-                  </a:ext>
-                </a:extLst>
-              </a:tr>
-              <a:tr h="760956">
-                <a:tc>
-                  <a:txBody>
-                    <a:bodyPr/>
-                    <a:lstStyle/>
-                    <a:p>
-                      <a:r>
-                        <a:rPr lang="en-US" dirty="0" smtClean="0"/>
-                        <a:t>Hanna</a:t>
-                      </a:r>
-                      <a:endParaRPr lang="en-US" dirty="0"/>
-                    </a:p>
-                  </a:txBody>
-                  <a:tcPr/>
-                </a:tc>
-                <a:tc>
-                  <a:txBody>
-                    <a:bodyPr/>
-                    <a:lstStyle/>
-                    <a:p>
-                      <a:endParaRPr lang="en-US"/>
-                    </a:p>
-                  </a:txBody>
-                  <a:tcPr/>
-                </a:tc>
-                <a:tc>
-                  <a:txBody>
-                    <a:bodyPr/>
-                    <a:lstStyle/>
-                    <a:p>
-                      <a:endParaRPr lang="en-US"/>
-                    </a:p>
-                  </a:txBody>
-                  <a:tcPr/>
-                </a:tc>
-                <a:tc>
-                  <a:txBody>
-                    <a:bodyPr/>
-                    <a:lstStyle/>
-                    <a:p>
-                      <a:endParaRPr lang="en-US"/>
-                    </a:p>
-                  </a:txBody>
-                  <a:tcPr/>
-                </a:tc>
-                <a:tc>
-                  <a:txBody>
-                    <a:bodyPr/>
-                    <a:lstStyle/>
-                    <a:p>
-                      <a:endParaRPr lang="en-US"/>
-                    </a:p>
-                  </a:txBody>
-                  <a:tcPr/>
-                </a:tc>
-                <a:tc>
-                  <a:txBody>
-                    <a:bodyPr/>
-                    <a:lstStyle/>
-                    <a:p>
-                      <a:endParaRPr lang="en-US"/>
-                    </a:p>
-                  </a:txBody>
-                  <a:tcPr/>
-                </a:tc>
-                <a:tc>
-                  <a:txBody>
-                    <a:bodyPr/>
-                    <a:lstStyle/>
-                    <a:p>
-                      <a:endParaRPr lang="en-US"/>
-                    </a:p>
-                  </a:txBody>
-                  <a:tcPr/>
-                </a:tc>
-                <a:tc>
-                  <a:txBody>
-                    <a:bodyPr/>
-                    <a:lstStyle/>
-                    <a:p>
-                      <a:endParaRPr lang="en-US"/>
-                    </a:p>
-                  </a:txBody>
-                  <a:tcPr/>
-                </a:tc>
-                <a:tc>
-                  <a:txBody>
-                    <a:bodyPr/>
-                    <a:lstStyle/>
-                    <a:p>
-                      <a:endParaRPr lang="en-US"/>
-                    </a:p>
-                  </a:txBody>
-                  <a:tcPr/>
-                </a:tc>
-                <a:extLst>
-                  <a:ext uri="{0D108BD9-81ED-4DB2-BD59-A6C34878D82A}">
-                    <a16:rowId xmlns:a16="http://schemas.microsoft.com/office/drawing/2014/main" val="3735476308"/>
-                  </a:ext>
-                </a:extLst>
-              </a:tr>
-              <a:tr h="760956">
-                <a:tc>
-                  <a:txBody>
-                    <a:bodyPr/>
-                    <a:lstStyle/>
-                    <a:p>
-                      <a:r>
-                        <a:rPr lang="en-US" dirty="0" smtClean="0"/>
-                        <a:t>Mostafa</a:t>
-                      </a:r>
-                      <a:endParaRPr lang="en-US" dirty="0"/>
-                    </a:p>
-                  </a:txBody>
-                  <a:tcPr/>
-                </a:tc>
-                <a:tc>
-                  <a:txBody>
-                    <a:bodyPr/>
-                    <a:lstStyle/>
-                    <a:p>
-                      <a:endParaRPr lang="en-US"/>
-                    </a:p>
-                  </a:txBody>
-                  <a:tcPr/>
-                </a:tc>
-                <a:tc>
-                  <a:txBody>
-                    <a:bodyPr/>
-                    <a:lstStyle/>
-                    <a:p>
-                      <a:endParaRPr lang="en-US"/>
-                    </a:p>
-                  </a:txBody>
-                  <a:tcPr/>
-                </a:tc>
-                <a:tc>
-                  <a:txBody>
-                    <a:bodyPr/>
-                    <a:lstStyle/>
-                    <a:p>
-                      <a:endParaRPr lang="en-US"/>
-                    </a:p>
-                  </a:txBody>
-                  <a:tcPr/>
-                </a:tc>
-                <a:tc>
-                  <a:txBody>
-                    <a:bodyPr/>
-                    <a:lstStyle/>
-                    <a:p>
-                      <a:endParaRPr lang="en-US"/>
-                    </a:p>
-                  </a:txBody>
-                  <a:tcPr/>
-                </a:tc>
-                <a:tc>
-                  <a:txBody>
-                    <a:bodyPr/>
-                    <a:lstStyle/>
-                    <a:p>
-                      <a:endParaRPr lang="en-US"/>
-                    </a:p>
-                  </a:txBody>
-                  <a:tcPr/>
-                </a:tc>
-                <a:tc>
-                  <a:txBody>
-                    <a:bodyPr/>
-                    <a:lstStyle/>
-                    <a:p>
-                      <a:endParaRPr lang="en-US"/>
-                    </a:p>
-                  </a:txBody>
-                  <a:tcPr/>
-                </a:tc>
-                <a:tc>
-                  <a:txBody>
-                    <a:bodyPr/>
-                    <a:lstStyle/>
-                    <a:p>
-                      <a:endParaRPr lang="en-US"/>
-                    </a:p>
-                  </a:txBody>
-                  <a:tcPr/>
-                </a:tc>
-                <a:tc>
-                  <a:txBody>
-                    <a:bodyPr/>
-                    <a:lstStyle/>
-                    <a:p>
-                      <a:endParaRPr lang="en-US" dirty="0"/>
-                    </a:p>
-                  </a:txBody>
-                  <a:tcPr/>
-                </a:tc>
-                <a:extLst>
-                  <a:ext uri="{0D108BD9-81ED-4DB2-BD59-A6C34878D82A}">
-                    <a16:rowId xmlns:a16="http://schemas.microsoft.com/office/drawing/2014/main" val="487817661"/>
-                  </a:ext>
-                </a:extLst>
-              </a:tr>
-            </a:tbl>
-          </a:graphicData>
-        </a:graphic>
-      </p:graphicFrame>
-    </p:spTree>
-    <p:extLst>
-      <p:ext uri="{BB962C8B-B14F-4D97-AF65-F5344CB8AC3E}">
-        <p14:creationId xmlns:p14="http://schemas.microsoft.com/office/powerpoint/2010/main" val="511521563"/>
-      </p:ext>
-    </p:extLst>
-  </p:cSld>
-  <p:clrMapOvr>
-    <a:masterClrMapping/>
-  </p:clrMapOvr>
   <p:timing>
     <p:tnLst>
       <p:par>

</xml_diff>